<commit_message>
Update Developing with Kubernetes.pptx
</commit_message>
<xml_diff>
--- a/2023-05-10 ABP Conf 2023 Developing with Kubernetes/Developing with Kubernetes.pptx
+++ b/2023-05-10 ABP Conf 2023 Developing with Kubernetes/Developing with Kubernetes.pptx
@@ -292,7 +292,7 @@
           <a:p>
             <a:fld id="{2A14C9FE-EBC3-45D3-899C-58AAF4F8AF71}" type="datetimeFigureOut">
               <a:rPr lang="en-US" smtClean="0"/>
-              <a:t>4/19/2023</a:t>
+              <a:t>4/20/2023</a:t>
             </a:fld>
             <a:endParaRPr lang="en-US"/>
           </a:p>
@@ -490,7 +490,7 @@
           <a:p>
             <a:fld id="{2A14C9FE-EBC3-45D3-899C-58AAF4F8AF71}" type="datetimeFigureOut">
               <a:rPr lang="en-US" smtClean="0"/>
-              <a:t>4/19/2023</a:t>
+              <a:t>4/20/2023</a:t>
             </a:fld>
             <a:endParaRPr lang="en-US"/>
           </a:p>
@@ -698,7 +698,7 @@
           <a:p>
             <a:fld id="{2A14C9FE-EBC3-45D3-899C-58AAF4F8AF71}" type="datetimeFigureOut">
               <a:rPr lang="en-US" smtClean="0"/>
-              <a:t>4/19/2023</a:t>
+              <a:t>4/20/2023</a:t>
             </a:fld>
             <a:endParaRPr lang="en-US"/>
           </a:p>
@@ -896,7 +896,7 @@
           <a:p>
             <a:fld id="{2A14C9FE-EBC3-45D3-899C-58AAF4F8AF71}" type="datetimeFigureOut">
               <a:rPr lang="en-US" smtClean="0"/>
-              <a:t>4/19/2023</a:t>
+              <a:t>4/20/2023</a:t>
             </a:fld>
             <a:endParaRPr lang="en-US"/>
           </a:p>
@@ -1171,7 +1171,7 @@
           <a:p>
             <a:fld id="{2A14C9FE-EBC3-45D3-899C-58AAF4F8AF71}" type="datetimeFigureOut">
               <a:rPr lang="en-US" smtClean="0"/>
-              <a:t>4/19/2023</a:t>
+              <a:t>4/20/2023</a:t>
             </a:fld>
             <a:endParaRPr lang="en-US"/>
           </a:p>
@@ -1436,7 +1436,7 @@
           <a:p>
             <a:fld id="{2A14C9FE-EBC3-45D3-899C-58AAF4F8AF71}" type="datetimeFigureOut">
               <a:rPr lang="en-US" smtClean="0"/>
-              <a:t>4/19/2023</a:t>
+              <a:t>4/20/2023</a:t>
             </a:fld>
             <a:endParaRPr lang="en-US"/>
           </a:p>
@@ -1848,7 +1848,7 @@
           <a:p>
             <a:fld id="{2A14C9FE-EBC3-45D3-899C-58AAF4F8AF71}" type="datetimeFigureOut">
               <a:rPr lang="en-US" smtClean="0"/>
-              <a:t>4/19/2023</a:t>
+              <a:t>4/20/2023</a:t>
             </a:fld>
             <a:endParaRPr lang="en-US"/>
           </a:p>
@@ -1989,7 +1989,7 @@
           <a:p>
             <a:fld id="{2A14C9FE-EBC3-45D3-899C-58AAF4F8AF71}" type="datetimeFigureOut">
               <a:rPr lang="en-US" smtClean="0"/>
-              <a:t>4/19/2023</a:t>
+              <a:t>4/20/2023</a:t>
             </a:fld>
             <a:endParaRPr lang="en-US"/>
           </a:p>
@@ -2102,7 +2102,7 @@
           <a:p>
             <a:fld id="{2A14C9FE-EBC3-45D3-899C-58AAF4F8AF71}" type="datetimeFigureOut">
               <a:rPr lang="en-US" smtClean="0"/>
-              <a:t>4/19/2023</a:t>
+              <a:t>4/20/2023</a:t>
             </a:fld>
             <a:endParaRPr lang="en-US"/>
           </a:p>
@@ -2413,7 +2413,7 @@
           <a:p>
             <a:fld id="{2A14C9FE-EBC3-45D3-899C-58AAF4F8AF71}" type="datetimeFigureOut">
               <a:rPr lang="en-US" smtClean="0"/>
-              <a:t>4/19/2023</a:t>
+              <a:t>4/20/2023</a:t>
             </a:fld>
             <a:endParaRPr lang="en-US"/>
           </a:p>
@@ -2701,7 +2701,7 @@
           <a:p>
             <a:fld id="{2A14C9FE-EBC3-45D3-899C-58AAF4F8AF71}" type="datetimeFigureOut">
               <a:rPr lang="en-US" smtClean="0"/>
-              <a:t>4/19/2023</a:t>
+              <a:t>4/20/2023</a:t>
             </a:fld>
             <a:endParaRPr lang="en-US"/>
           </a:p>
@@ -2942,7 +2942,7 @@
           <a:p>
             <a:fld id="{2A14C9FE-EBC3-45D3-899C-58AAF4F8AF71}" type="datetimeFigureOut">
               <a:rPr lang="en-US" smtClean="0"/>
-              <a:t>4/19/2023</a:t>
+              <a:t>4/20/2023</a:t>
             </a:fld>
             <a:endParaRPr lang="en-US"/>
           </a:p>
@@ -3404,26 +3404,7 @@
                 <a:latin typeface="Euclid Circular B" panose="020B0504000000000000" pitchFamily="34" charset="0"/>
                 <a:ea typeface="Euclid Circular B" panose="020B0504000000000000" pitchFamily="34" charset="0"/>
               </a:rPr>
-              <a:t>EFFICIENTLY DEVELOP</a:t>
-            </a:r>
-            <a:br>
-              <a:rPr lang="tr-TR" sz="4000" b="1" dirty="0">
-                <a:solidFill>
-                  <a:srgbClr val="292D33"/>
-                </a:solidFill>
-                <a:latin typeface="Euclid Circular B" panose="020B0504000000000000" pitchFamily="34" charset="0"/>
-                <a:ea typeface="Euclid Circular B" panose="020B0504000000000000" pitchFamily="34" charset="0"/>
-              </a:rPr>
-            </a:br>
-            <a:r>
-              <a:rPr lang="tr-TR" sz="4000" b="1" dirty="0">
-                <a:solidFill>
-                  <a:srgbClr val="292D33"/>
-                </a:solidFill>
-                <a:latin typeface="Euclid Circular B" panose="020B0504000000000000" pitchFamily="34" charset="0"/>
-                <a:ea typeface="Euclid Circular B" panose="020B0504000000000000" pitchFamily="34" charset="0"/>
-              </a:rPr>
-              <a:t>MICROSERVICES IN KUBERNETES</a:t>
+              <a:t>EFFICIENTLY INTEGRATE KUBERNETES TO YOUR DEVELOPMENT ENVIRONMENT</a:t>
             </a:r>
             <a:endParaRPr lang="en-US" sz="4000" b="1" dirty="0">
               <a:solidFill>
@@ -3465,7 +3446,20 @@
               </a:rPr>
               <a:t>Halil İbrahim Kalkan</a:t>
             </a:r>
-            <a:endParaRPr lang="en-US" sz="2800" dirty="0">
+            <a:br>
+              <a:rPr lang="tr-TR" sz="2800" dirty="0">
+                <a:latin typeface="Euclid Circular B" panose="020B0504000000000000" pitchFamily="34" charset="0"/>
+                <a:ea typeface="Euclid Circular B" panose="020B0504000000000000" pitchFamily="34" charset="0"/>
+              </a:rPr>
+            </a:br>
+            <a:r>
+              <a:rPr lang="tr-TR" i="1" dirty="0">
+                <a:latin typeface="Euclid Circular B" panose="020B0504000000000000" pitchFamily="34" charset="0"/>
+                <a:ea typeface="Euclid Circular B" panose="020B0504000000000000" pitchFamily="34" charset="0"/>
+              </a:rPr>
+              <a:t>Volosoft</a:t>
+            </a:r>
+            <a:endParaRPr lang="en-US" sz="2800" i="1" dirty="0">
               <a:latin typeface="Euclid Circular B" panose="020B0504000000000000" pitchFamily="34" charset="0"/>
               <a:ea typeface="Euclid Circular B" panose="020B0504000000000000" pitchFamily="34" charset="0"/>
             </a:endParaRPr>
@@ -4628,14 +4622,14 @@
           <a:lstStyle/>
           <a:p>
             <a:r>
-              <a:rPr lang="tr-TR" b="1" dirty="0">
+              <a:rPr lang="en-US" sz="4400" b="1" dirty="0">
                 <a:solidFill>
                   <a:srgbClr val="292D33"/>
                 </a:solidFill>
                 <a:latin typeface="Euclid Circular B" panose="020B0504000000000000" pitchFamily="34" charset="0"/>
                 <a:ea typeface="Euclid Circular B" panose="020B0504000000000000" pitchFamily="34" charset="0"/>
               </a:rPr>
-              <a:t>About me, ABP and Volosoft</a:t>
+              <a:t>About Me: Halil İbrahim Kalkan</a:t>
             </a:r>
             <a:endParaRPr lang="en-US" b="1" dirty="0">
               <a:solidFill>
@@ -4647,41 +4641,470 @@
           </a:p>
         </p:txBody>
       </p:sp>
-      <p:sp>
-        <p:nvSpPr>
-          <p:cNvPr id="3" name="Content Placeholder 2">
-            <a:extLst>
-              <a:ext uri="{FF2B5EF4-FFF2-40B4-BE49-F238E27FC236}">
-                <a16:creationId xmlns:a16="http://schemas.microsoft.com/office/drawing/2014/main" id="{891C7693-D3DF-4635-96F4-97F3B4136FDF}"/>
-              </a:ext>
-            </a:extLst>
-          </p:cNvPr>
-          <p:cNvSpPr>
-            <a:spLocks noGrp="1"/>
-          </p:cNvSpPr>
-          <p:nvPr>
-            <p:ph idx="1"/>
-          </p:nvPr>
-        </p:nvSpPr>
-        <p:spPr/>
-        <p:txBody>
-          <a:bodyPr/>
-          <a:lstStyle/>
-          <a:p>
-            <a:r>
-              <a:rPr lang="tr-TR" dirty="0">
-                <a:latin typeface="Euclid Circular B" panose="020B0504000000000000" pitchFamily="34" charset="0"/>
-                <a:ea typeface="Euclid Circular B" panose="020B0504000000000000" pitchFamily="34" charset="0"/>
-              </a:rPr>
-              <a:t>TODO...</a:t>
-            </a:r>
-            <a:endParaRPr lang="en-US" dirty="0">
-              <a:latin typeface="Euclid Circular B" panose="020B0504000000000000" pitchFamily="34" charset="0"/>
-              <a:ea typeface="Euclid Circular B" panose="020B0504000000000000" pitchFamily="34" charset="0"/>
-            </a:endParaRPr>
-          </a:p>
-        </p:txBody>
-      </p:sp>
+      <p:pic>
+        <p:nvPicPr>
+          <p:cNvPr id="6" name="Picture 5" descr="Logo&#10;&#10;Description automatically generated">
+            <a:extLst>
+              <a:ext uri="{FF2B5EF4-FFF2-40B4-BE49-F238E27FC236}">
+                <a16:creationId xmlns:a16="http://schemas.microsoft.com/office/drawing/2014/main" id="{C7EA17F0-F0DC-E07D-55A4-19A837F82E29}"/>
+              </a:ext>
+            </a:extLst>
+          </p:cNvPr>
+          <p:cNvPicPr>
+            <a:picLocks noChangeAspect="1"/>
+          </p:cNvPicPr>
+          <p:nvPr/>
+        </p:nvPicPr>
+        <p:blipFill>
+          <a:blip r:embed="rId3">
+            <a:extLst>
+              <a:ext uri="{28A0092B-C50C-407E-A947-70E740481C1C}">
+                <a14:useLocalDpi xmlns:a14="http://schemas.microsoft.com/office/drawing/2010/main" val="0"/>
+              </a:ext>
+            </a:extLst>
+          </a:blip>
+          <a:stretch>
+            <a:fillRect/>
+          </a:stretch>
+        </p:blipFill>
+        <p:spPr>
+          <a:xfrm>
+            <a:off x="838200" y="3299202"/>
+            <a:ext cx="2349905" cy="574845"/>
+          </a:xfrm>
+          <a:prstGeom prst="rect">
+            <a:avLst/>
+          </a:prstGeom>
+        </p:spPr>
+      </p:pic>
+      <p:pic>
+        <p:nvPicPr>
+          <p:cNvPr id="7" name="Picture 6" descr="Shape&#10;&#10;Description automatically generated with low confidence">
+            <a:extLst>
+              <a:ext uri="{FF2B5EF4-FFF2-40B4-BE49-F238E27FC236}">
+                <a16:creationId xmlns:a16="http://schemas.microsoft.com/office/drawing/2014/main" id="{2F89AF3B-EBD2-0423-64F3-4822FFF0C3B7}"/>
+              </a:ext>
+            </a:extLst>
+          </p:cNvPr>
+          <p:cNvPicPr>
+            <a:picLocks noChangeAspect="1"/>
+          </p:cNvPicPr>
+          <p:nvPr/>
+        </p:nvPicPr>
+        <p:blipFill>
+          <a:blip r:embed="rId4">
+            <a:extLst>
+              <a:ext uri="{28A0092B-C50C-407E-A947-70E740481C1C}">
+                <a14:useLocalDpi xmlns:a14="http://schemas.microsoft.com/office/drawing/2010/main" val="0"/>
+              </a:ext>
+            </a:extLst>
+          </a:blip>
+          <a:stretch>
+            <a:fillRect/>
+          </a:stretch>
+        </p:blipFill>
+        <p:spPr>
+          <a:xfrm>
+            <a:off x="838200" y="1690688"/>
+            <a:ext cx="574845" cy="574845"/>
+          </a:xfrm>
+          <a:prstGeom prst="rect">
+            <a:avLst/>
+          </a:prstGeom>
+        </p:spPr>
+      </p:pic>
+      <p:pic>
+        <p:nvPicPr>
+          <p:cNvPr id="8" name="Picture 7" descr="Graphical user interface&#10;&#10;Description automatically generated">
+            <a:extLst>
+              <a:ext uri="{FF2B5EF4-FFF2-40B4-BE49-F238E27FC236}">
+                <a16:creationId xmlns:a16="http://schemas.microsoft.com/office/drawing/2014/main" id="{6FE70F93-F185-2114-3B33-2DBF0B0AD686}"/>
+              </a:ext>
+            </a:extLst>
+          </p:cNvPr>
+          <p:cNvPicPr>
+            <a:picLocks noChangeAspect="1"/>
+          </p:cNvPicPr>
+          <p:nvPr/>
+        </p:nvPicPr>
+        <p:blipFill>
+          <a:blip r:embed="rId5">
+            <a:extLst>
+              <a:ext uri="{28A0092B-C50C-407E-A947-70E740481C1C}">
+                <a14:useLocalDpi xmlns:a14="http://schemas.microsoft.com/office/drawing/2010/main" val="0"/>
+              </a:ext>
+            </a:extLst>
+          </a:blip>
+          <a:stretch>
+            <a:fillRect/>
+          </a:stretch>
+        </p:blipFill>
+        <p:spPr>
+          <a:xfrm>
+            <a:off x="842521" y="2445727"/>
+            <a:ext cx="570524" cy="570524"/>
+          </a:xfrm>
+          <a:prstGeom prst="rect">
+            <a:avLst/>
+          </a:prstGeom>
+        </p:spPr>
+      </p:pic>
+      <p:sp>
+        <p:nvSpPr>
+          <p:cNvPr id="9" name="TextBox 8">
+            <a:extLst>
+              <a:ext uri="{FF2B5EF4-FFF2-40B4-BE49-F238E27FC236}">
+                <a16:creationId xmlns:a16="http://schemas.microsoft.com/office/drawing/2014/main" id="{EDB6F50F-0ACE-B34B-9C4B-4C382BA9B8CA}"/>
+              </a:ext>
+            </a:extLst>
+          </p:cNvPr>
+          <p:cNvSpPr txBox="1"/>
+          <p:nvPr/>
+        </p:nvSpPr>
+        <p:spPr>
+          <a:xfrm>
+            <a:off x="1593619" y="1793444"/>
+            <a:ext cx="6294076" cy="369332"/>
+          </a:xfrm>
+          <a:prstGeom prst="rect">
+            <a:avLst/>
+          </a:prstGeom>
+          <a:noFill/>
+        </p:spPr>
+        <p:txBody>
+          <a:bodyPr wrap="square" rtlCol="0">
+            <a:spAutoFit/>
+          </a:bodyPr>
+          <a:lstStyle/>
+          <a:p>
+            <a:r>
+              <a:rPr lang="en-US" dirty="0"/>
+              <a:t>2007, Computer Engineering, </a:t>
+            </a:r>
+            <a:r>
+              <a:rPr lang="en-US" dirty="0" err="1"/>
+              <a:t>Sakarya</a:t>
+            </a:r>
+            <a:r>
+              <a:rPr lang="en-US" dirty="0"/>
+              <a:t> University</a:t>
+            </a:r>
+          </a:p>
+        </p:txBody>
+      </p:sp>
+      <p:sp>
+        <p:nvSpPr>
+          <p:cNvPr id="10" name="TextBox 9">
+            <a:extLst>
+              <a:ext uri="{FF2B5EF4-FFF2-40B4-BE49-F238E27FC236}">
+                <a16:creationId xmlns:a16="http://schemas.microsoft.com/office/drawing/2014/main" id="{2B22F27A-60ED-6AED-27F0-2AAEF61BE66E}"/>
+              </a:ext>
+            </a:extLst>
+          </p:cNvPr>
+          <p:cNvSpPr txBox="1"/>
+          <p:nvPr/>
+        </p:nvSpPr>
+        <p:spPr>
+          <a:xfrm>
+            <a:off x="1593618" y="2546323"/>
+            <a:ext cx="7264135" cy="369332"/>
+          </a:xfrm>
+          <a:prstGeom prst="rect">
+            <a:avLst/>
+          </a:prstGeom>
+          <a:noFill/>
+        </p:spPr>
+        <p:txBody>
+          <a:bodyPr wrap="square" rtlCol="0">
+            <a:spAutoFit/>
+          </a:bodyPr>
+          <a:lstStyle/>
+          <a:p>
+            <a:r>
+              <a:rPr lang="en-US" dirty="0"/>
+              <a:t>2007 - 2015: Software developer, software architect, team leader</a:t>
+            </a:r>
+          </a:p>
+        </p:txBody>
+      </p:sp>
+      <p:sp>
+        <p:nvSpPr>
+          <p:cNvPr id="11" name="TextBox 10">
+            <a:extLst>
+              <a:ext uri="{FF2B5EF4-FFF2-40B4-BE49-F238E27FC236}">
+                <a16:creationId xmlns:a16="http://schemas.microsoft.com/office/drawing/2014/main" id="{43FA7E45-FD16-64DE-F20B-CA75D30D3E9A}"/>
+              </a:ext>
+            </a:extLst>
+          </p:cNvPr>
+          <p:cNvSpPr txBox="1"/>
+          <p:nvPr/>
+        </p:nvSpPr>
+        <p:spPr>
+          <a:xfrm>
+            <a:off x="3399890" y="3401958"/>
+            <a:ext cx="5569182" cy="369332"/>
+          </a:xfrm>
+          <a:prstGeom prst="rect">
+            <a:avLst/>
+          </a:prstGeom>
+          <a:noFill/>
+        </p:spPr>
+        <p:txBody>
+          <a:bodyPr wrap="square" rtlCol="0">
+            <a:spAutoFit/>
+          </a:bodyPr>
+          <a:lstStyle/>
+          <a:p>
+            <a:r>
+              <a:rPr lang="en-US" dirty="0"/>
+              <a:t>2016 - ∞: Co-founder, software architect</a:t>
+            </a:r>
+          </a:p>
+        </p:txBody>
+      </p:sp>
+      <p:sp>
+        <p:nvSpPr>
+          <p:cNvPr id="12" name="TextBox 11">
+            <a:extLst>
+              <a:ext uri="{FF2B5EF4-FFF2-40B4-BE49-F238E27FC236}">
+                <a16:creationId xmlns:a16="http://schemas.microsoft.com/office/drawing/2014/main" id="{4CBAEA4F-0156-9F75-A256-C1E38BB23E5C}"/>
+              </a:ext>
+            </a:extLst>
+          </p:cNvPr>
+          <p:cNvSpPr txBox="1"/>
+          <p:nvPr/>
+        </p:nvSpPr>
+        <p:spPr>
+          <a:xfrm>
+            <a:off x="2703444" y="4239531"/>
+            <a:ext cx="6154310" cy="369332"/>
+          </a:xfrm>
+          <a:prstGeom prst="rect">
+            <a:avLst/>
+          </a:prstGeom>
+          <a:noFill/>
+        </p:spPr>
+        <p:txBody>
+          <a:bodyPr wrap="square" rtlCol="0">
+            <a:spAutoFit/>
+          </a:bodyPr>
+          <a:lstStyle/>
+          <a:p>
+            <a:r>
+              <a:rPr lang="en-US" dirty="0"/>
+              <a:t>2013 - ∞: Lead developer of the open source ABP Framework</a:t>
+            </a:r>
+          </a:p>
+        </p:txBody>
+      </p:sp>
+      <p:pic>
+        <p:nvPicPr>
+          <p:cNvPr id="13" name="Picture 12">
+            <a:extLst>
+              <a:ext uri="{FF2B5EF4-FFF2-40B4-BE49-F238E27FC236}">
+                <a16:creationId xmlns:a16="http://schemas.microsoft.com/office/drawing/2014/main" id="{7EDE0B14-485A-9ED9-8F61-00E6F7BB36A2}"/>
+              </a:ext>
+            </a:extLst>
+          </p:cNvPr>
+          <p:cNvPicPr>
+            <a:picLocks noChangeAspect="1"/>
+          </p:cNvPicPr>
+          <p:nvPr/>
+        </p:nvPicPr>
+        <p:blipFill>
+          <a:blip r:embed="rId6">
+            <a:extLst>
+              <a:ext uri="{28A0092B-C50C-407E-A947-70E740481C1C}">
+                <a14:useLocalDpi xmlns:a14="http://schemas.microsoft.com/office/drawing/2010/main" val="0"/>
+              </a:ext>
+            </a:extLst>
+          </a:blip>
+          <a:stretch>
+            <a:fillRect/>
+          </a:stretch>
+        </p:blipFill>
+        <p:spPr>
+          <a:xfrm>
+            <a:off x="838200" y="4907716"/>
+            <a:ext cx="570524" cy="570524"/>
+          </a:xfrm>
+          <a:prstGeom prst="rect">
+            <a:avLst/>
+          </a:prstGeom>
+        </p:spPr>
+      </p:pic>
+      <p:sp>
+        <p:nvSpPr>
+          <p:cNvPr id="14" name="TextBox 13">
+            <a:extLst>
+              <a:ext uri="{FF2B5EF4-FFF2-40B4-BE49-F238E27FC236}">
+                <a16:creationId xmlns:a16="http://schemas.microsoft.com/office/drawing/2014/main" id="{CF4DEBBC-8835-939C-11E7-3B30C54E9CE4}"/>
+              </a:ext>
+            </a:extLst>
+          </p:cNvPr>
+          <p:cNvSpPr txBox="1"/>
+          <p:nvPr/>
+        </p:nvSpPr>
+        <p:spPr>
+          <a:xfrm>
+            <a:off x="1523382" y="5006151"/>
+            <a:ext cx="7445689" cy="369332"/>
+          </a:xfrm>
+          <a:prstGeom prst="rect">
+            <a:avLst/>
+          </a:prstGeom>
+          <a:noFill/>
+        </p:spPr>
+        <p:txBody>
+          <a:bodyPr wrap="square" rtlCol="0">
+            <a:spAutoFit/>
+          </a:bodyPr>
+          <a:lstStyle/>
+          <a:p>
+            <a:r>
+              <a:rPr lang="en-US" dirty="0"/>
+              <a:t>Multi-threading, distributed systems, OOP, DDD, software architectures.. etc.</a:t>
+            </a:r>
+          </a:p>
+        </p:txBody>
+      </p:sp>
+      <p:pic>
+        <p:nvPicPr>
+          <p:cNvPr id="15" name="Picture 14">
+            <a:extLst>
+              <a:ext uri="{FF2B5EF4-FFF2-40B4-BE49-F238E27FC236}">
+                <a16:creationId xmlns:a16="http://schemas.microsoft.com/office/drawing/2014/main" id="{F12FBA65-A644-1E60-CEC9-19A1C91C2497}"/>
+              </a:ext>
+            </a:extLst>
+          </p:cNvPr>
+          <p:cNvPicPr>
+            <a:picLocks noChangeAspect="1"/>
+          </p:cNvPicPr>
+          <p:nvPr/>
+        </p:nvPicPr>
+        <p:blipFill>
+          <a:blip r:embed="rId7"/>
+          <a:stretch>
+            <a:fillRect/>
+          </a:stretch>
+        </p:blipFill>
+        <p:spPr>
+          <a:xfrm>
+            <a:off x="8857753" y="390996"/>
+            <a:ext cx="3027844" cy="6177614"/>
+          </a:xfrm>
+          <a:prstGeom prst="rect">
+            <a:avLst/>
+          </a:prstGeom>
+        </p:spPr>
+      </p:pic>
+      <p:pic>
+        <p:nvPicPr>
+          <p:cNvPr id="16" name="Picture 15" descr="Shape&#10;&#10;Description automatically generated with low confidence">
+            <a:extLst>
+              <a:ext uri="{FF2B5EF4-FFF2-40B4-BE49-F238E27FC236}">
+                <a16:creationId xmlns:a16="http://schemas.microsoft.com/office/drawing/2014/main" id="{68C2DE39-FD60-342E-CB34-A01B8DA491CF}"/>
+              </a:ext>
+            </a:extLst>
+          </p:cNvPr>
+          <p:cNvPicPr>
+            <a:picLocks noChangeAspect="1"/>
+          </p:cNvPicPr>
+          <p:nvPr/>
+        </p:nvPicPr>
+        <p:blipFill>
+          <a:blip r:embed="rId8">
+            <a:extLst>
+              <a:ext uri="{28A0092B-C50C-407E-A947-70E740481C1C}">
+                <a14:useLocalDpi xmlns:a14="http://schemas.microsoft.com/office/drawing/2010/main" val="0"/>
+              </a:ext>
+            </a:extLst>
+          </a:blip>
+          <a:stretch>
+            <a:fillRect/>
+          </a:stretch>
+        </p:blipFill>
+        <p:spPr>
+          <a:xfrm>
+            <a:off x="838200" y="5662755"/>
+            <a:ext cx="570524" cy="570524"/>
+          </a:xfrm>
+          <a:prstGeom prst="rect">
+            <a:avLst/>
+          </a:prstGeom>
+        </p:spPr>
+      </p:pic>
+      <p:sp>
+        <p:nvSpPr>
+          <p:cNvPr id="17" name="TextBox 16">
+            <a:extLst>
+              <a:ext uri="{FF2B5EF4-FFF2-40B4-BE49-F238E27FC236}">
+                <a16:creationId xmlns:a16="http://schemas.microsoft.com/office/drawing/2014/main" id="{7B93B491-21EE-AC3B-FCE5-0C2803BA89AC}"/>
+              </a:ext>
+            </a:extLst>
+          </p:cNvPr>
+          <p:cNvSpPr txBox="1"/>
+          <p:nvPr/>
+        </p:nvSpPr>
+        <p:spPr>
+          <a:xfrm>
+            <a:off x="1523382" y="5763351"/>
+            <a:ext cx="6873196" cy="369332"/>
+          </a:xfrm>
+          <a:prstGeom prst="rect">
+            <a:avLst/>
+          </a:prstGeom>
+          <a:noFill/>
+        </p:spPr>
+        <p:txBody>
+          <a:bodyPr wrap="square" rtlCol="0">
+            <a:spAutoFit/>
+          </a:bodyPr>
+          <a:lstStyle/>
+          <a:p>
+            <a:r>
+              <a:rPr lang="en-US" dirty="0"/>
+              <a:t>Highly active coder, mostly open source.</a:t>
+            </a:r>
+          </a:p>
+        </p:txBody>
+      </p:sp>
+      <p:pic>
+        <p:nvPicPr>
+          <p:cNvPr id="18" name="Picture 17" descr="Icon&#10;&#10;Description automatically generated">
+            <a:extLst>
+              <a:ext uri="{FF2B5EF4-FFF2-40B4-BE49-F238E27FC236}">
+                <a16:creationId xmlns:a16="http://schemas.microsoft.com/office/drawing/2014/main" id="{67CD63F2-CF85-66B5-F6E9-9D827FC05E4E}"/>
+              </a:ext>
+            </a:extLst>
+          </p:cNvPr>
+          <p:cNvPicPr>
+            <a:picLocks noChangeAspect="1"/>
+          </p:cNvPicPr>
+          <p:nvPr/>
+        </p:nvPicPr>
+        <p:blipFill>
+          <a:blip r:embed="rId9">
+            <a:extLst>
+              <a:ext uri="{28A0092B-C50C-407E-A947-70E740481C1C}">
+                <a14:useLocalDpi xmlns:a14="http://schemas.microsoft.com/office/drawing/2010/main" val="0"/>
+              </a:ext>
+            </a:extLst>
+          </a:blip>
+          <a:stretch>
+            <a:fillRect/>
+          </a:stretch>
+        </p:blipFill>
+        <p:spPr>
+          <a:xfrm>
+            <a:off x="838200" y="4188110"/>
+            <a:ext cx="1776130" cy="476410"/>
+          </a:xfrm>
+          <a:prstGeom prst="rect">
+            <a:avLst/>
+          </a:prstGeom>
+        </p:spPr>
+      </p:pic>
     </p:spTree>
     <p:extLst>
       <p:ext uri="{BB962C8B-B14F-4D97-AF65-F5344CB8AC3E}">
@@ -4692,6 +5115,607 @@
   <p:clrMapOvr>
     <a:masterClrMapping/>
   </p:clrMapOvr>
+  <p:timing>
+    <p:tnLst>
+      <p:par>
+        <p:cTn id="1" dur="indefinite" restart="never" nodeType="tmRoot">
+          <p:childTnLst>
+            <p:seq concurrent="1" nextAc="seek">
+              <p:cTn id="2" dur="indefinite" nodeType="mainSeq">
+                <p:childTnLst>
+                  <p:par>
+                    <p:cTn id="3" fill="hold">
+                      <p:stCondLst>
+                        <p:cond delay="indefinite"/>
+                      </p:stCondLst>
+                      <p:childTnLst>
+                        <p:par>
+                          <p:cTn id="4" fill="hold">
+                            <p:stCondLst>
+                              <p:cond delay="0"/>
+                            </p:stCondLst>
+                            <p:childTnLst>
+                              <p:par>
+                                <p:cTn id="5" presetID="10" presetClass="entr" presetSubtype="0" fill="hold" nodeType="clickEffect">
+                                  <p:stCondLst>
+                                    <p:cond delay="0"/>
+                                  </p:stCondLst>
+                                  <p:childTnLst>
+                                    <p:set>
+                                      <p:cBhvr>
+                                        <p:cTn id="6" dur="1" fill="hold">
+                                          <p:stCondLst>
+                                            <p:cond delay="0"/>
+                                          </p:stCondLst>
+                                        </p:cTn>
+                                        <p:tgtEl>
+                                          <p:spTgt spid="7"/>
+                                        </p:tgtEl>
+                                        <p:attrNameLst>
+                                          <p:attrName>style.visibility</p:attrName>
+                                        </p:attrNameLst>
+                                      </p:cBhvr>
+                                      <p:to>
+                                        <p:strVal val="visible"/>
+                                      </p:to>
+                                    </p:set>
+                                    <p:animEffect transition="in" filter="fade">
+                                      <p:cBhvr>
+                                        <p:cTn id="7" dur="500"/>
+                                        <p:tgtEl>
+                                          <p:spTgt spid="7"/>
+                                        </p:tgtEl>
+                                      </p:cBhvr>
+                                    </p:animEffect>
+                                  </p:childTnLst>
+                                </p:cTn>
+                              </p:par>
+                              <p:par>
+                                <p:cTn id="8" presetID="10" presetClass="entr" presetSubtype="0" fill="hold" grpId="0" nodeType="withEffect">
+                                  <p:stCondLst>
+                                    <p:cond delay="0"/>
+                                  </p:stCondLst>
+                                  <p:childTnLst>
+                                    <p:set>
+                                      <p:cBhvr>
+                                        <p:cTn id="9" dur="1" fill="hold">
+                                          <p:stCondLst>
+                                            <p:cond delay="0"/>
+                                          </p:stCondLst>
+                                        </p:cTn>
+                                        <p:tgtEl>
+                                          <p:spTgt spid="9"/>
+                                        </p:tgtEl>
+                                        <p:attrNameLst>
+                                          <p:attrName>style.visibility</p:attrName>
+                                        </p:attrNameLst>
+                                      </p:cBhvr>
+                                      <p:to>
+                                        <p:strVal val="visible"/>
+                                      </p:to>
+                                    </p:set>
+                                    <p:animEffect transition="in" filter="fade">
+                                      <p:cBhvr>
+                                        <p:cTn id="10" dur="500"/>
+                                        <p:tgtEl>
+                                          <p:spTgt spid="9"/>
+                                        </p:tgtEl>
+                                      </p:cBhvr>
+                                    </p:animEffect>
+                                  </p:childTnLst>
+                                </p:cTn>
+                              </p:par>
+                            </p:childTnLst>
+                          </p:cTn>
+                        </p:par>
+                      </p:childTnLst>
+                    </p:cTn>
+                  </p:par>
+                  <p:par>
+                    <p:cTn id="11" fill="hold">
+                      <p:stCondLst>
+                        <p:cond delay="indefinite"/>
+                      </p:stCondLst>
+                      <p:childTnLst>
+                        <p:par>
+                          <p:cTn id="12" fill="hold">
+                            <p:stCondLst>
+                              <p:cond delay="0"/>
+                            </p:stCondLst>
+                            <p:childTnLst>
+                              <p:par>
+                                <p:cTn id="13" presetID="10" presetClass="entr" presetSubtype="0" fill="hold" nodeType="clickEffect">
+                                  <p:stCondLst>
+                                    <p:cond delay="0"/>
+                                  </p:stCondLst>
+                                  <p:childTnLst>
+                                    <p:set>
+                                      <p:cBhvr>
+                                        <p:cTn id="14" dur="1" fill="hold">
+                                          <p:stCondLst>
+                                            <p:cond delay="0"/>
+                                          </p:stCondLst>
+                                        </p:cTn>
+                                        <p:tgtEl>
+                                          <p:spTgt spid="8"/>
+                                        </p:tgtEl>
+                                        <p:attrNameLst>
+                                          <p:attrName>style.visibility</p:attrName>
+                                        </p:attrNameLst>
+                                      </p:cBhvr>
+                                      <p:to>
+                                        <p:strVal val="visible"/>
+                                      </p:to>
+                                    </p:set>
+                                    <p:animEffect transition="in" filter="fade">
+                                      <p:cBhvr>
+                                        <p:cTn id="15" dur="500"/>
+                                        <p:tgtEl>
+                                          <p:spTgt spid="8"/>
+                                        </p:tgtEl>
+                                      </p:cBhvr>
+                                    </p:animEffect>
+                                  </p:childTnLst>
+                                </p:cTn>
+                              </p:par>
+                              <p:par>
+                                <p:cTn id="16" presetID="10" presetClass="entr" presetSubtype="0" fill="hold" grpId="0" nodeType="withEffect">
+                                  <p:stCondLst>
+                                    <p:cond delay="0"/>
+                                  </p:stCondLst>
+                                  <p:childTnLst>
+                                    <p:set>
+                                      <p:cBhvr>
+                                        <p:cTn id="17" dur="1" fill="hold">
+                                          <p:stCondLst>
+                                            <p:cond delay="0"/>
+                                          </p:stCondLst>
+                                        </p:cTn>
+                                        <p:tgtEl>
+                                          <p:spTgt spid="10"/>
+                                        </p:tgtEl>
+                                        <p:attrNameLst>
+                                          <p:attrName>style.visibility</p:attrName>
+                                        </p:attrNameLst>
+                                      </p:cBhvr>
+                                      <p:to>
+                                        <p:strVal val="visible"/>
+                                      </p:to>
+                                    </p:set>
+                                    <p:animEffect transition="in" filter="fade">
+                                      <p:cBhvr>
+                                        <p:cTn id="18" dur="500"/>
+                                        <p:tgtEl>
+                                          <p:spTgt spid="10"/>
+                                        </p:tgtEl>
+                                      </p:cBhvr>
+                                    </p:animEffect>
+                                  </p:childTnLst>
+                                </p:cTn>
+                              </p:par>
+                            </p:childTnLst>
+                          </p:cTn>
+                        </p:par>
+                      </p:childTnLst>
+                    </p:cTn>
+                  </p:par>
+                  <p:par>
+                    <p:cTn id="19" fill="hold">
+                      <p:stCondLst>
+                        <p:cond delay="indefinite"/>
+                      </p:stCondLst>
+                      <p:childTnLst>
+                        <p:par>
+                          <p:cTn id="20" fill="hold">
+                            <p:stCondLst>
+                              <p:cond delay="0"/>
+                            </p:stCondLst>
+                            <p:childTnLst>
+                              <p:par>
+                                <p:cTn id="21" presetID="10" presetClass="entr" presetSubtype="0" fill="hold" grpId="0" nodeType="clickEffect">
+                                  <p:stCondLst>
+                                    <p:cond delay="0"/>
+                                  </p:stCondLst>
+                                  <p:childTnLst>
+                                    <p:set>
+                                      <p:cBhvr>
+                                        <p:cTn id="22" dur="1" fill="hold">
+                                          <p:stCondLst>
+                                            <p:cond delay="0"/>
+                                          </p:stCondLst>
+                                        </p:cTn>
+                                        <p:tgtEl>
+                                          <p:spTgt spid="11"/>
+                                        </p:tgtEl>
+                                        <p:attrNameLst>
+                                          <p:attrName>style.visibility</p:attrName>
+                                        </p:attrNameLst>
+                                      </p:cBhvr>
+                                      <p:to>
+                                        <p:strVal val="visible"/>
+                                      </p:to>
+                                    </p:set>
+                                    <p:animEffect transition="in" filter="fade">
+                                      <p:cBhvr>
+                                        <p:cTn id="23" dur="500"/>
+                                        <p:tgtEl>
+                                          <p:spTgt spid="11"/>
+                                        </p:tgtEl>
+                                      </p:cBhvr>
+                                    </p:animEffect>
+                                  </p:childTnLst>
+                                </p:cTn>
+                              </p:par>
+                              <p:par>
+                                <p:cTn id="24" presetID="10" presetClass="entr" presetSubtype="0" fill="hold" nodeType="withEffect">
+                                  <p:stCondLst>
+                                    <p:cond delay="0"/>
+                                  </p:stCondLst>
+                                  <p:childTnLst>
+                                    <p:set>
+                                      <p:cBhvr>
+                                        <p:cTn id="25" dur="1" fill="hold">
+                                          <p:stCondLst>
+                                            <p:cond delay="0"/>
+                                          </p:stCondLst>
+                                        </p:cTn>
+                                        <p:tgtEl>
+                                          <p:spTgt spid="6"/>
+                                        </p:tgtEl>
+                                        <p:attrNameLst>
+                                          <p:attrName>style.visibility</p:attrName>
+                                        </p:attrNameLst>
+                                      </p:cBhvr>
+                                      <p:to>
+                                        <p:strVal val="visible"/>
+                                      </p:to>
+                                    </p:set>
+                                    <p:animEffect transition="in" filter="fade">
+                                      <p:cBhvr>
+                                        <p:cTn id="26" dur="500"/>
+                                        <p:tgtEl>
+                                          <p:spTgt spid="6"/>
+                                        </p:tgtEl>
+                                      </p:cBhvr>
+                                    </p:animEffect>
+                                  </p:childTnLst>
+                                </p:cTn>
+                              </p:par>
+                            </p:childTnLst>
+                          </p:cTn>
+                        </p:par>
+                      </p:childTnLst>
+                    </p:cTn>
+                  </p:par>
+                  <p:par>
+                    <p:cTn id="27" fill="hold">
+                      <p:stCondLst>
+                        <p:cond delay="indefinite"/>
+                      </p:stCondLst>
+                      <p:childTnLst>
+                        <p:par>
+                          <p:cTn id="28" fill="hold">
+                            <p:stCondLst>
+                              <p:cond delay="0"/>
+                            </p:stCondLst>
+                            <p:childTnLst>
+                              <p:par>
+                                <p:cTn id="29" presetID="10" presetClass="entr" presetSubtype="0" fill="hold" nodeType="clickEffect">
+                                  <p:stCondLst>
+                                    <p:cond delay="0"/>
+                                  </p:stCondLst>
+                                  <p:childTnLst>
+                                    <p:set>
+                                      <p:cBhvr>
+                                        <p:cTn id="30" dur="1" fill="hold">
+                                          <p:stCondLst>
+                                            <p:cond delay="0"/>
+                                          </p:stCondLst>
+                                        </p:cTn>
+                                        <p:tgtEl>
+                                          <p:spTgt spid="18"/>
+                                        </p:tgtEl>
+                                        <p:attrNameLst>
+                                          <p:attrName>style.visibility</p:attrName>
+                                        </p:attrNameLst>
+                                      </p:cBhvr>
+                                      <p:to>
+                                        <p:strVal val="visible"/>
+                                      </p:to>
+                                    </p:set>
+                                    <p:animEffect transition="in" filter="fade">
+                                      <p:cBhvr>
+                                        <p:cTn id="31" dur="500"/>
+                                        <p:tgtEl>
+                                          <p:spTgt spid="18"/>
+                                        </p:tgtEl>
+                                      </p:cBhvr>
+                                    </p:animEffect>
+                                  </p:childTnLst>
+                                </p:cTn>
+                              </p:par>
+                              <p:par>
+                                <p:cTn id="32" presetID="10" presetClass="entr" presetSubtype="0" fill="hold" grpId="0" nodeType="withEffect">
+                                  <p:stCondLst>
+                                    <p:cond delay="0"/>
+                                  </p:stCondLst>
+                                  <p:childTnLst>
+                                    <p:set>
+                                      <p:cBhvr>
+                                        <p:cTn id="33" dur="1" fill="hold">
+                                          <p:stCondLst>
+                                            <p:cond delay="0"/>
+                                          </p:stCondLst>
+                                        </p:cTn>
+                                        <p:tgtEl>
+                                          <p:spTgt spid="12"/>
+                                        </p:tgtEl>
+                                        <p:attrNameLst>
+                                          <p:attrName>style.visibility</p:attrName>
+                                        </p:attrNameLst>
+                                      </p:cBhvr>
+                                      <p:to>
+                                        <p:strVal val="visible"/>
+                                      </p:to>
+                                    </p:set>
+                                    <p:animEffect transition="in" filter="fade">
+                                      <p:cBhvr>
+                                        <p:cTn id="34" dur="500"/>
+                                        <p:tgtEl>
+                                          <p:spTgt spid="12"/>
+                                        </p:tgtEl>
+                                      </p:cBhvr>
+                                    </p:animEffect>
+                                  </p:childTnLst>
+                                </p:cTn>
+                              </p:par>
+                            </p:childTnLst>
+                          </p:cTn>
+                        </p:par>
+                      </p:childTnLst>
+                    </p:cTn>
+                  </p:par>
+                  <p:par>
+                    <p:cTn id="35" fill="hold">
+                      <p:stCondLst>
+                        <p:cond delay="indefinite"/>
+                      </p:stCondLst>
+                      <p:childTnLst>
+                        <p:par>
+                          <p:cTn id="36" fill="hold">
+                            <p:stCondLst>
+                              <p:cond delay="0"/>
+                            </p:stCondLst>
+                            <p:childTnLst>
+                              <p:par>
+                                <p:cTn id="37" presetID="10" presetClass="entr" presetSubtype="0" fill="hold" grpId="0" nodeType="clickEffect">
+                                  <p:stCondLst>
+                                    <p:cond delay="0"/>
+                                  </p:stCondLst>
+                                  <p:childTnLst>
+                                    <p:set>
+                                      <p:cBhvr>
+                                        <p:cTn id="38" dur="1" fill="hold">
+                                          <p:stCondLst>
+                                            <p:cond delay="0"/>
+                                          </p:stCondLst>
+                                        </p:cTn>
+                                        <p:tgtEl>
+                                          <p:spTgt spid="14"/>
+                                        </p:tgtEl>
+                                        <p:attrNameLst>
+                                          <p:attrName>style.visibility</p:attrName>
+                                        </p:attrNameLst>
+                                      </p:cBhvr>
+                                      <p:to>
+                                        <p:strVal val="visible"/>
+                                      </p:to>
+                                    </p:set>
+                                    <p:animEffect transition="in" filter="fade">
+                                      <p:cBhvr>
+                                        <p:cTn id="39" dur="500"/>
+                                        <p:tgtEl>
+                                          <p:spTgt spid="14"/>
+                                        </p:tgtEl>
+                                      </p:cBhvr>
+                                    </p:animEffect>
+                                  </p:childTnLst>
+                                </p:cTn>
+                              </p:par>
+                              <p:par>
+                                <p:cTn id="40" presetID="10" presetClass="entr" presetSubtype="0" fill="hold" nodeType="withEffect">
+                                  <p:stCondLst>
+                                    <p:cond delay="0"/>
+                                  </p:stCondLst>
+                                  <p:childTnLst>
+                                    <p:set>
+                                      <p:cBhvr>
+                                        <p:cTn id="41" dur="1" fill="hold">
+                                          <p:stCondLst>
+                                            <p:cond delay="0"/>
+                                          </p:stCondLst>
+                                        </p:cTn>
+                                        <p:tgtEl>
+                                          <p:spTgt spid="13"/>
+                                        </p:tgtEl>
+                                        <p:attrNameLst>
+                                          <p:attrName>style.visibility</p:attrName>
+                                        </p:attrNameLst>
+                                      </p:cBhvr>
+                                      <p:to>
+                                        <p:strVal val="visible"/>
+                                      </p:to>
+                                    </p:set>
+                                    <p:animEffect transition="in" filter="fade">
+                                      <p:cBhvr>
+                                        <p:cTn id="42" dur="500"/>
+                                        <p:tgtEl>
+                                          <p:spTgt spid="13"/>
+                                        </p:tgtEl>
+                                      </p:cBhvr>
+                                    </p:animEffect>
+                                  </p:childTnLst>
+                                </p:cTn>
+                              </p:par>
+                            </p:childTnLst>
+                          </p:cTn>
+                        </p:par>
+                      </p:childTnLst>
+                    </p:cTn>
+                  </p:par>
+                  <p:par>
+                    <p:cTn id="43" fill="hold">
+                      <p:stCondLst>
+                        <p:cond delay="indefinite"/>
+                      </p:stCondLst>
+                      <p:childTnLst>
+                        <p:par>
+                          <p:cTn id="44" fill="hold">
+                            <p:stCondLst>
+                              <p:cond delay="0"/>
+                            </p:stCondLst>
+                            <p:childTnLst>
+                              <p:par>
+                                <p:cTn id="45" presetID="10" presetClass="entr" presetSubtype="0" fill="hold" grpId="0" nodeType="clickEffect">
+                                  <p:stCondLst>
+                                    <p:cond delay="0"/>
+                                  </p:stCondLst>
+                                  <p:childTnLst>
+                                    <p:set>
+                                      <p:cBhvr>
+                                        <p:cTn id="46" dur="1" fill="hold">
+                                          <p:stCondLst>
+                                            <p:cond delay="0"/>
+                                          </p:stCondLst>
+                                        </p:cTn>
+                                        <p:tgtEl>
+                                          <p:spTgt spid="17"/>
+                                        </p:tgtEl>
+                                        <p:attrNameLst>
+                                          <p:attrName>style.visibility</p:attrName>
+                                        </p:attrNameLst>
+                                      </p:cBhvr>
+                                      <p:to>
+                                        <p:strVal val="visible"/>
+                                      </p:to>
+                                    </p:set>
+                                    <p:animEffect transition="in" filter="fade">
+                                      <p:cBhvr>
+                                        <p:cTn id="47" dur="500"/>
+                                        <p:tgtEl>
+                                          <p:spTgt spid="17"/>
+                                        </p:tgtEl>
+                                      </p:cBhvr>
+                                    </p:animEffect>
+                                  </p:childTnLst>
+                                </p:cTn>
+                              </p:par>
+                              <p:par>
+                                <p:cTn id="48" presetID="10" presetClass="entr" presetSubtype="0" fill="hold" nodeType="withEffect">
+                                  <p:stCondLst>
+                                    <p:cond delay="0"/>
+                                  </p:stCondLst>
+                                  <p:childTnLst>
+                                    <p:set>
+                                      <p:cBhvr>
+                                        <p:cTn id="49" dur="1" fill="hold">
+                                          <p:stCondLst>
+                                            <p:cond delay="0"/>
+                                          </p:stCondLst>
+                                        </p:cTn>
+                                        <p:tgtEl>
+                                          <p:spTgt spid="16"/>
+                                        </p:tgtEl>
+                                        <p:attrNameLst>
+                                          <p:attrName>style.visibility</p:attrName>
+                                        </p:attrNameLst>
+                                      </p:cBhvr>
+                                      <p:to>
+                                        <p:strVal val="visible"/>
+                                      </p:to>
+                                    </p:set>
+                                    <p:animEffect transition="in" filter="fade">
+                                      <p:cBhvr>
+                                        <p:cTn id="50" dur="500"/>
+                                        <p:tgtEl>
+                                          <p:spTgt spid="16"/>
+                                        </p:tgtEl>
+                                      </p:cBhvr>
+                                    </p:animEffect>
+                                  </p:childTnLst>
+                                </p:cTn>
+                              </p:par>
+                              <p:par>
+                                <p:cTn id="51" presetID="10" presetClass="entr" presetSubtype="0" fill="hold" nodeType="withEffect">
+                                  <p:stCondLst>
+                                    <p:cond delay="0"/>
+                                  </p:stCondLst>
+                                  <p:childTnLst>
+                                    <p:set>
+                                      <p:cBhvr>
+                                        <p:cTn id="52" dur="1" fill="hold">
+                                          <p:stCondLst>
+                                            <p:cond delay="0"/>
+                                          </p:stCondLst>
+                                        </p:cTn>
+                                        <p:tgtEl>
+                                          <p:spTgt spid="15"/>
+                                        </p:tgtEl>
+                                        <p:attrNameLst>
+                                          <p:attrName>style.visibility</p:attrName>
+                                        </p:attrNameLst>
+                                      </p:cBhvr>
+                                      <p:to>
+                                        <p:strVal val="visible"/>
+                                      </p:to>
+                                    </p:set>
+                                    <p:animEffect transition="in" filter="fade">
+                                      <p:cBhvr>
+                                        <p:cTn id="53" dur="500"/>
+                                        <p:tgtEl>
+                                          <p:spTgt spid="15"/>
+                                        </p:tgtEl>
+                                      </p:cBhvr>
+                                    </p:animEffect>
+                                  </p:childTnLst>
+                                </p:cTn>
+                              </p:par>
+                            </p:childTnLst>
+                          </p:cTn>
+                        </p:par>
+                      </p:childTnLst>
+                    </p:cTn>
+                  </p:par>
+                </p:childTnLst>
+              </p:cTn>
+              <p:prevCondLst>
+                <p:cond evt="onPrev" delay="0">
+                  <p:tgtEl>
+                    <p:sldTgt/>
+                  </p:tgtEl>
+                </p:cond>
+              </p:prevCondLst>
+              <p:nextCondLst>
+                <p:cond evt="onNext" delay="0">
+                  <p:tgtEl>
+                    <p:sldTgt/>
+                  </p:tgtEl>
+                </p:cond>
+              </p:nextCondLst>
+            </p:seq>
+          </p:childTnLst>
+        </p:cTn>
+      </p:par>
+    </p:tnLst>
+    <p:bldLst>
+      <p:bldP spid="9" grpId="0"/>
+      <p:bldP spid="10" grpId="0"/>
+      <p:bldP spid="11" grpId="0"/>
+      <p:bldP spid="12" grpId="0"/>
+      <p:bldP spid="14" grpId="0"/>
+      <p:bldP spid="17" grpId="0"/>
+    </p:bldLst>
+  </p:timing>
 </p:sld>
 </file>
 
@@ -5883,7 +6907,7 @@
                 <a:latin typeface="Euclid Circular B" panose="020B0504000000000000" pitchFamily="34" charset="0"/>
                 <a:ea typeface="Euclid Circular B" panose="020B0504000000000000" pitchFamily="34" charset="0"/>
               </a:rPr>
-              <a:t>Challenges of developing microservice solutions</a:t>
+              <a:t>Difficuties of a microservice development environment</a:t>
             </a:r>
           </a:p>
           <a:p>
@@ -5894,6 +6918,13 @@
               </a:rPr>
               <a:t>The Project Tye</a:t>
             </a:r>
+            <a:r>
+              <a:rPr lang="tr-TR" i="1" dirty="0">
+                <a:latin typeface="Euclid Circular B" panose="020B0504000000000000" pitchFamily="34" charset="0"/>
+                <a:ea typeface="Euclid Circular B" panose="020B0504000000000000" pitchFamily="34" charset="0"/>
+              </a:rPr>
+              <a:t> (with demo)</a:t>
+            </a:r>
           </a:p>
           <a:p>
             <a:r>
@@ -5903,6 +6934,13 @@
               </a:rPr>
               <a:t>ABP Studio: Solution Runner</a:t>
             </a:r>
+            <a:r>
+              <a:rPr lang="tr-TR" i="1" dirty="0">
+                <a:latin typeface="Euclid Circular B" panose="020B0504000000000000" pitchFamily="34" charset="0"/>
+                <a:ea typeface="Euclid Circular B" panose="020B0504000000000000" pitchFamily="34" charset="0"/>
+              </a:rPr>
+              <a:t> (with demo)</a:t>
+            </a:r>
           </a:p>
           <a:p>
             <a:r>
@@ -5912,7 +6950,14 @@
               </a:rPr>
               <a:t>ABP Studio: Kubernetes Tunneling</a:t>
             </a:r>
-            <a:endParaRPr lang="en-US" dirty="0">
+            <a:r>
+              <a:rPr lang="tr-TR" i="1" dirty="0">
+                <a:latin typeface="Euclid Circular B" panose="020B0504000000000000" pitchFamily="34" charset="0"/>
+                <a:ea typeface="Euclid Circular B" panose="020B0504000000000000" pitchFamily="34" charset="0"/>
+              </a:rPr>
+              <a:t> (with demo)</a:t>
+            </a:r>
+            <a:endParaRPr lang="en-US" i="1" dirty="0">
               <a:latin typeface="Euclid Circular B" panose="020B0504000000000000" pitchFamily="34" charset="0"/>
               <a:ea typeface="Euclid Circular B" panose="020B0504000000000000" pitchFamily="34" charset="0"/>
             </a:endParaRPr>
@@ -5929,6 +6974,280 @@
   <p:clrMapOvr>
     <a:masterClrMapping/>
   </p:clrMapOvr>
+  <p:timing>
+    <p:tnLst>
+      <p:par>
+        <p:cTn id="1" dur="indefinite" restart="never" nodeType="tmRoot">
+          <p:childTnLst>
+            <p:seq concurrent="1" nextAc="seek">
+              <p:cTn id="2" dur="indefinite" nodeType="mainSeq">
+                <p:childTnLst>
+                  <p:par>
+                    <p:cTn id="3" fill="hold">
+                      <p:stCondLst>
+                        <p:cond delay="indefinite"/>
+                      </p:stCondLst>
+                      <p:childTnLst>
+                        <p:par>
+                          <p:cTn id="4" fill="hold">
+                            <p:stCondLst>
+                              <p:cond delay="0"/>
+                            </p:stCondLst>
+                            <p:childTnLst>
+                              <p:par>
+                                <p:cTn id="5" presetID="10" presetClass="entr" presetSubtype="0" fill="hold" nodeType="clickEffect">
+                                  <p:stCondLst>
+                                    <p:cond delay="0"/>
+                                  </p:stCondLst>
+                                  <p:childTnLst>
+                                    <p:set>
+                                      <p:cBhvr>
+                                        <p:cTn id="6" dur="1" fill="hold">
+                                          <p:stCondLst>
+                                            <p:cond delay="0"/>
+                                          </p:stCondLst>
+                                        </p:cTn>
+                                        <p:tgtEl>
+                                          <p:spTgt spid="3">
+                                            <p:txEl>
+                                              <p:pRg st="0" end="0"/>
+                                            </p:txEl>
+                                          </p:spTgt>
+                                        </p:tgtEl>
+                                        <p:attrNameLst>
+                                          <p:attrName>style.visibility</p:attrName>
+                                        </p:attrNameLst>
+                                      </p:cBhvr>
+                                      <p:to>
+                                        <p:strVal val="visible"/>
+                                      </p:to>
+                                    </p:set>
+                                    <p:animEffect transition="in" filter="fade">
+                                      <p:cBhvr>
+                                        <p:cTn id="7" dur="500"/>
+                                        <p:tgtEl>
+                                          <p:spTgt spid="3">
+                                            <p:txEl>
+                                              <p:pRg st="0" end="0"/>
+                                            </p:txEl>
+                                          </p:spTgt>
+                                        </p:tgtEl>
+                                      </p:cBhvr>
+                                    </p:animEffect>
+                                  </p:childTnLst>
+                                </p:cTn>
+                              </p:par>
+                            </p:childTnLst>
+                          </p:cTn>
+                        </p:par>
+                      </p:childTnLst>
+                    </p:cTn>
+                  </p:par>
+                  <p:par>
+                    <p:cTn id="8" fill="hold">
+                      <p:stCondLst>
+                        <p:cond delay="indefinite"/>
+                      </p:stCondLst>
+                      <p:childTnLst>
+                        <p:par>
+                          <p:cTn id="9" fill="hold">
+                            <p:stCondLst>
+                              <p:cond delay="0"/>
+                            </p:stCondLst>
+                            <p:childTnLst>
+                              <p:par>
+                                <p:cTn id="10" presetID="10" presetClass="entr" presetSubtype="0" fill="hold" nodeType="clickEffect">
+                                  <p:stCondLst>
+                                    <p:cond delay="0"/>
+                                  </p:stCondLst>
+                                  <p:childTnLst>
+                                    <p:set>
+                                      <p:cBhvr>
+                                        <p:cTn id="11" dur="1" fill="hold">
+                                          <p:stCondLst>
+                                            <p:cond delay="0"/>
+                                          </p:stCondLst>
+                                        </p:cTn>
+                                        <p:tgtEl>
+                                          <p:spTgt spid="3">
+                                            <p:txEl>
+                                              <p:pRg st="1" end="1"/>
+                                            </p:txEl>
+                                          </p:spTgt>
+                                        </p:tgtEl>
+                                        <p:attrNameLst>
+                                          <p:attrName>style.visibility</p:attrName>
+                                        </p:attrNameLst>
+                                      </p:cBhvr>
+                                      <p:to>
+                                        <p:strVal val="visible"/>
+                                      </p:to>
+                                    </p:set>
+                                    <p:animEffect transition="in" filter="fade">
+                                      <p:cBhvr>
+                                        <p:cTn id="12" dur="500"/>
+                                        <p:tgtEl>
+                                          <p:spTgt spid="3">
+                                            <p:txEl>
+                                              <p:pRg st="1" end="1"/>
+                                            </p:txEl>
+                                          </p:spTgt>
+                                        </p:tgtEl>
+                                      </p:cBhvr>
+                                    </p:animEffect>
+                                  </p:childTnLst>
+                                </p:cTn>
+                              </p:par>
+                            </p:childTnLst>
+                          </p:cTn>
+                        </p:par>
+                      </p:childTnLst>
+                    </p:cTn>
+                  </p:par>
+                  <p:par>
+                    <p:cTn id="13" fill="hold">
+                      <p:stCondLst>
+                        <p:cond delay="indefinite"/>
+                      </p:stCondLst>
+                      <p:childTnLst>
+                        <p:par>
+                          <p:cTn id="14" fill="hold">
+                            <p:stCondLst>
+                              <p:cond delay="0"/>
+                            </p:stCondLst>
+                            <p:childTnLst>
+                              <p:par>
+                                <p:cTn id="15" presetID="10" presetClass="entr" presetSubtype="0" fill="hold" nodeType="clickEffect">
+                                  <p:stCondLst>
+                                    <p:cond delay="0"/>
+                                  </p:stCondLst>
+                                  <p:childTnLst>
+                                    <p:set>
+                                      <p:cBhvr>
+                                        <p:cTn id="16" dur="1" fill="hold">
+                                          <p:stCondLst>
+                                            <p:cond delay="0"/>
+                                          </p:stCondLst>
+                                        </p:cTn>
+                                        <p:tgtEl>
+                                          <p:spTgt spid="3">
+                                            <p:txEl>
+                                              <p:pRg st="2" end="2"/>
+                                            </p:txEl>
+                                          </p:spTgt>
+                                        </p:tgtEl>
+                                        <p:attrNameLst>
+                                          <p:attrName>style.visibility</p:attrName>
+                                        </p:attrNameLst>
+                                      </p:cBhvr>
+                                      <p:to>
+                                        <p:strVal val="visible"/>
+                                      </p:to>
+                                    </p:set>
+                                    <p:animEffect transition="in" filter="fade">
+                                      <p:cBhvr>
+                                        <p:cTn id="17" dur="500"/>
+                                        <p:tgtEl>
+                                          <p:spTgt spid="3">
+                                            <p:txEl>
+                                              <p:pRg st="2" end="2"/>
+                                            </p:txEl>
+                                          </p:spTgt>
+                                        </p:tgtEl>
+                                      </p:cBhvr>
+                                    </p:animEffect>
+                                  </p:childTnLst>
+                                </p:cTn>
+                              </p:par>
+                            </p:childTnLst>
+                          </p:cTn>
+                        </p:par>
+                      </p:childTnLst>
+                    </p:cTn>
+                  </p:par>
+                  <p:par>
+                    <p:cTn id="18" fill="hold">
+                      <p:stCondLst>
+                        <p:cond delay="indefinite"/>
+                      </p:stCondLst>
+                      <p:childTnLst>
+                        <p:par>
+                          <p:cTn id="19" fill="hold">
+                            <p:stCondLst>
+                              <p:cond delay="0"/>
+                            </p:stCondLst>
+                            <p:childTnLst>
+                              <p:par>
+                                <p:cTn id="20" presetID="10" presetClass="entr" presetSubtype="0" fill="hold" nodeType="clickEffect">
+                                  <p:stCondLst>
+                                    <p:cond delay="0"/>
+                                  </p:stCondLst>
+                                  <p:childTnLst>
+                                    <p:set>
+                                      <p:cBhvr>
+                                        <p:cTn id="21" dur="1" fill="hold">
+                                          <p:stCondLst>
+                                            <p:cond delay="0"/>
+                                          </p:stCondLst>
+                                        </p:cTn>
+                                        <p:tgtEl>
+                                          <p:spTgt spid="3">
+                                            <p:txEl>
+                                              <p:pRg st="3" end="3"/>
+                                            </p:txEl>
+                                          </p:spTgt>
+                                        </p:tgtEl>
+                                        <p:attrNameLst>
+                                          <p:attrName>style.visibility</p:attrName>
+                                        </p:attrNameLst>
+                                      </p:cBhvr>
+                                      <p:to>
+                                        <p:strVal val="visible"/>
+                                      </p:to>
+                                    </p:set>
+                                    <p:animEffect transition="in" filter="fade">
+                                      <p:cBhvr>
+                                        <p:cTn id="22" dur="500"/>
+                                        <p:tgtEl>
+                                          <p:spTgt spid="3">
+                                            <p:txEl>
+                                              <p:pRg st="3" end="3"/>
+                                            </p:txEl>
+                                          </p:spTgt>
+                                        </p:tgtEl>
+                                      </p:cBhvr>
+                                    </p:animEffect>
+                                  </p:childTnLst>
+                                </p:cTn>
+                              </p:par>
+                            </p:childTnLst>
+                          </p:cTn>
+                        </p:par>
+                      </p:childTnLst>
+                    </p:cTn>
+                  </p:par>
+                </p:childTnLst>
+              </p:cTn>
+              <p:prevCondLst>
+                <p:cond evt="onPrev" delay="0">
+                  <p:tgtEl>
+                    <p:sldTgt/>
+                  </p:tgtEl>
+                </p:cond>
+              </p:prevCondLst>
+              <p:nextCondLst>
+                <p:cond evt="onNext" delay="0">
+                  <p:tgtEl>
+                    <p:sldTgt/>
+                  </p:tgtEl>
+                </p:cond>
+              </p:nextCondLst>
+            </p:seq>
+          </p:childTnLst>
+        </p:cTn>
+      </p:par>
+    </p:tnLst>
+  </p:timing>
 </p:sld>
 </file>
 
@@ -6539,26 +7858,7 @@
                 <a:latin typeface="Euclid Circular B" panose="020B0504000000000000" pitchFamily="34" charset="0"/>
                 <a:ea typeface="Euclid Circular B" panose="020B0504000000000000" pitchFamily="34" charset="0"/>
               </a:rPr>
-              <a:t>CHALLENGES OF</a:t>
-            </a:r>
-            <a:br>
-              <a:rPr lang="tr-TR" sz="4000" b="1" dirty="0">
-                <a:solidFill>
-                  <a:srgbClr val="292D33"/>
-                </a:solidFill>
-                <a:latin typeface="Euclid Circular B" panose="020B0504000000000000" pitchFamily="34" charset="0"/>
-                <a:ea typeface="Euclid Circular B" panose="020B0504000000000000" pitchFamily="34" charset="0"/>
-              </a:rPr>
-            </a:br>
-            <a:r>
-              <a:rPr lang="tr-TR" sz="4000" b="1" dirty="0">
-                <a:solidFill>
-                  <a:srgbClr val="292D33"/>
-                </a:solidFill>
-                <a:latin typeface="Euclid Circular B" panose="020B0504000000000000" pitchFamily="34" charset="0"/>
-                <a:ea typeface="Euclid Circular B" panose="020B0504000000000000" pitchFamily="34" charset="0"/>
-              </a:rPr>
-              <a:t>DEVELOPING MICROSERVICE SOLUTIONS</a:t>
+              <a:t>DIFFICULTIES OF A MICROSERVICE DEVELOPMENT ENVIRONMENT</a:t>
             </a:r>
             <a:endParaRPr lang="en-US" sz="4000" b="1" dirty="0">
               <a:solidFill>

</xml_diff>